<commit_message>
Nessus and nikto scans
</commit_message>
<xml_diff>
--- a/evidence.pptx
+++ b/evidence.pptx
@@ -5,11 +5,16 @@
     <p:sldMasterId id="2147483648" r:id="rId1"/>
   </p:sldMasterIdLst>
   <p:notesMasterIdLst>
-    <p:notesMasterId r:id="rId4"/>
+    <p:notesMasterId r:id="rId9"/>
   </p:notesMasterIdLst>
   <p:sldIdLst>
     <p:sldId id="256" r:id="rId2"/>
     <p:sldId id="257" r:id="rId3"/>
+    <p:sldId id="258" r:id="rId4"/>
+    <p:sldId id="259" r:id="rId5"/>
+    <p:sldId id="260" r:id="rId6"/>
+    <p:sldId id="261" r:id="rId7"/>
+    <p:sldId id="262" r:id="rId8"/>
   </p:sldIdLst>
   <p:sldSz cx="12192000" cy="6858000"/>
   <p:notesSz cx="6858000" cy="9144000"/>
@@ -3983,6 +3988,505 @@
     <p:extLst>
       <p:ext uri="{BB962C8B-B14F-4D97-AF65-F5344CB8AC3E}">
         <p14:creationId xmlns:p14="http://schemas.microsoft.com/office/powerpoint/2010/main" val="170233972"/>
+      </p:ext>
+    </p:extLst>
+  </p:cSld>
+  <p:clrMapOvr>
+    <a:masterClrMapping/>
+  </p:clrMapOvr>
+</p:sld>
+</file>
+
+<file path=ppt/slides/slide3.xml><?xml version="1.0" encoding="utf-8"?>
+<p:sld xmlns:a="http://schemas.openxmlformats.org/drawingml/2006/main" xmlns:r="http://schemas.openxmlformats.org/officeDocument/2006/relationships" xmlns:p="http://schemas.openxmlformats.org/presentationml/2006/main">
+  <p:cSld>
+    <p:spTree>
+      <p:nvGrpSpPr>
+        <p:cNvPr id="1" name=""/>
+        <p:cNvGrpSpPr/>
+        <p:nvPr/>
+      </p:nvGrpSpPr>
+      <p:grpSpPr>
+        <a:xfrm>
+          <a:off x="0" y="0"/>
+          <a:ext cx="0" cy="0"/>
+          <a:chOff x="0" y="0"/>
+          <a:chExt cx="0" cy="0"/>
+        </a:xfrm>
+      </p:grpSpPr>
+      <p:sp>
+        <p:nvSpPr>
+          <p:cNvPr id="2" name="Title 1">
+            <a:extLst>
+              <a:ext uri="{FF2B5EF4-FFF2-40B4-BE49-F238E27FC236}">
+                <a16:creationId xmlns:a16="http://schemas.microsoft.com/office/drawing/2014/main" id="{9530B464-9EFA-8081-133C-41D998B89245}"/>
+              </a:ext>
+            </a:extLst>
+          </p:cNvPr>
+          <p:cNvSpPr>
+            <a:spLocks noGrp="1"/>
+          </p:cNvSpPr>
+          <p:nvPr>
+            <p:ph type="title"/>
+          </p:nvPr>
+        </p:nvSpPr>
+        <p:spPr/>
+        <p:txBody>
+          <a:bodyPr/>
+          <a:lstStyle/>
+          <a:p>
+            <a:r>
+              <a:rPr lang="en-GB" dirty="0"/>
+              <a:t>Search the Information System for Vulnerabilities without </a:t>
+            </a:r>
+            <a:r>
+              <a:rPr lang="en-GB" dirty="0" err="1"/>
+              <a:t>Wazuh</a:t>
+            </a:r>
+            <a:endParaRPr lang="en-AU" dirty="0"/>
+          </a:p>
+        </p:txBody>
+      </p:sp>
+      <p:sp>
+        <p:nvSpPr>
+          <p:cNvPr id="3" name="Content Placeholder 2">
+            <a:extLst>
+              <a:ext uri="{FF2B5EF4-FFF2-40B4-BE49-F238E27FC236}">
+                <a16:creationId xmlns:a16="http://schemas.microsoft.com/office/drawing/2014/main" id="{1CCD4DD4-D157-8BFF-703D-A7703B05800F}"/>
+              </a:ext>
+            </a:extLst>
+          </p:cNvPr>
+          <p:cNvSpPr>
+            <a:spLocks noGrp="1"/>
+          </p:cNvSpPr>
+          <p:nvPr>
+            <p:ph idx="1"/>
+          </p:nvPr>
+        </p:nvSpPr>
+        <p:spPr/>
+        <p:txBody>
+          <a:bodyPr/>
+          <a:lstStyle/>
+          <a:p>
+            <a:r>
+              <a:rPr lang="en-AU" dirty="0"/>
+              <a:t>Nessus</a:t>
+            </a:r>
+          </a:p>
+          <a:p>
+            <a:r>
+              <a:rPr lang="en-AU" dirty="0" err="1"/>
+              <a:t>Nikto</a:t>
+            </a:r>
+            <a:endParaRPr lang="en-AU" dirty="0"/>
+          </a:p>
+          <a:p>
+            <a:r>
+              <a:rPr lang="en-AU" dirty="0"/>
+              <a:t>Legion</a:t>
+            </a:r>
+          </a:p>
+          <a:p>
+            <a:r>
+              <a:rPr lang="en-AU" dirty="0"/>
+              <a:t>Nmap</a:t>
+            </a:r>
+          </a:p>
+          <a:p>
+            <a:r>
+              <a:rPr lang="en-AU" dirty="0"/>
+              <a:t>Wafw00f</a:t>
+            </a:r>
+          </a:p>
+        </p:txBody>
+      </p:sp>
+    </p:spTree>
+    <p:extLst>
+      <p:ext uri="{BB962C8B-B14F-4D97-AF65-F5344CB8AC3E}">
+        <p14:creationId xmlns:p14="http://schemas.microsoft.com/office/powerpoint/2010/main" val="2234134793"/>
+      </p:ext>
+    </p:extLst>
+  </p:cSld>
+  <p:clrMapOvr>
+    <a:masterClrMapping/>
+  </p:clrMapOvr>
+</p:sld>
+</file>
+
+<file path=ppt/slides/slide4.xml><?xml version="1.0" encoding="utf-8"?>
+<p:sld xmlns:a="http://schemas.openxmlformats.org/drawingml/2006/main" xmlns:r="http://schemas.openxmlformats.org/officeDocument/2006/relationships" xmlns:p="http://schemas.openxmlformats.org/presentationml/2006/main">
+  <p:cSld>
+    <p:spTree>
+      <p:nvGrpSpPr>
+        <p:cNvPr id="1" name=""/>
+        <p:cNvGrpSpPr/>
+        <p:nvPr/>
+      </p:nvGrpSpPr>
+      <p:grpSpPr>
+        <a:xfrm>
+          <a:off x="0" y="0"/>
+          <a:ext cx="0" cy="0"/>
+          <a:chOff x="0" y="0"/>
+          <a:chExt cx="0" cy="0"/>
+        </a:xfrm>
+      </p:grpSpPr>
+      <p:sp>
+        <p:nvSpPr>
+          <p:cNvPr id="2" name="Title 1">
+            <a:extLst>
+              <a:ext uri="{FF2B5EF4-FFF2-40B4-BE49-F238E27FC236}">
+                <a16:creationId xmlns:a16="http://schemas.microsoft.com/office/drawing/2014/main" id="{F12A0D7E-FFDB-3A20-A957-9F0E1871AF3D}"/>
+              </a:ext>
+            </a:extLst>
+          </p:cNvPr>
+          <p:cNvSpPr>
+            <a:spLocks noGrp="1"/>
+          </p:cNvSpPr>
+          <p:nvPr>
+            <p:ph type="title"/>
+          </p:nvPr>
+        </p:nvSpPr>
+        <p:spPr/>
+        <p:txBody>
+          <a:bodyPr/>
+          <a:lstStyle/>
+          <a:p>
+            <a:r>
+              <a:rPr lang="en-AU" dirty="0"/>
+              <a:t>Nessus</a:t>
+            </a:r>
+          </a:p>
+        </p:txBody>
+      </p:sp>
+    </p:spTree>
+    <p:extLst>
+      <p:ext uri="{BB962C8B-B14F-4D97-AF65-F5344CB8AC3E}">
+        <p14:creationId xmlns:p14="http://schemas.microsoft.com/office/powerpoint/2010/main" val="1285793284"/>
+      </p:ext>
+    </p:extLst>
+  </p:cSld>
+  <p:clrMapOvr>
+    <a:masterClrMapping/>
+  </p:clrMapOvr>
+</p:sld>
+</file>
+
+<file path=ppt/slides/slide5.xml><?xml version="1.0" encoding="utf-8"?>
+<p:sld xmlns:a="http://schemas.openxmlformats.org/drawingml/2006/main" xmlns:r="http://schemas.openxmlformats.org/officeDocument/2006/relationships" xmlns:p="http://schemas.openxmlformats.org/presentationml/2006/main">
+  <p:cSld>
+    <p:spTree>
+      <p:nvGrpSpPr>
+        <p:cNvPr id="1" name=""/>
+        <p:cNvGrpSpPr/>
+        <p:nvPr/>
+      </p:nvGrpSpPr>
+      <p:grpSpPr>
+        <a:xfrm>
+          <a:off x="0" y="0"/>
+          <a:ext cx="0" cy="0"/>
+          <a:chOff x="0" y="0"/>
+          <a:chExt cx="0" cy="0"/>
+        </a:xfrm>
+      </p:grpSpPr>
+      <p:sp>
+        <p:nvSpPr>
+          <p:cNvPr id="2" name="Title 1">
+            <a:extLst>
+              <a:ext uri="{FF2B5EF4-FFF2-40B4-BE49-F238E27FC236}">
+                <a16:creationId xmlns:a16="http://schemas.microsoft.com/office/drawing/2014/main" id="{2DA32E7B-9F5A-A09D-7920-E574AC3A8083}"/>
+              </a:ext>
+            </a:extLst>
+          </p:cNvPr>
+          <p:cNvSpPr>
+            <a:spLocks noGrp="1"/>
+          </p:cNvSpPr>
+          <p:nvPr>
+            <p:ph type="title"/>
+          </p:nvPr>
+        </p:nvSpPr>
+        <p:spPr/>
+        <p:txBody>
+          <a:bodyPr/>
+          <a:lstStyle/>
+          <a:p>
+            <a:r>
+              <a:rPr lang="en-GB" dirty="0" err="1"/>
+              <a:t>Nikto</a:t>
+            </a:r>
+            <a:r>
+              <a:rPr lang="en-GB" dirty="0"/>
+              <a:t> DC machine</a:t>
+            </a:r>
+            <a:endParaRPr lang="en-AU" dirty="0"/>
+          </a:p>
+        </p:txBody>
+      </p:sp>
+      <p:pic>
+        <p:nvPicPr>
+          <p:cNvPr id="5" name="Picture 4">
+            <a:extLst>
+              <a:ext uri="{FF2B5EF4-FFF2-40B4-BE49-F238E27FC236}">
+                <a16:creationId xmlns:a16="http://schemas.microsoft.com/office/drawing/2014/main" id="{DA735FBB-06FA-5CEC-60C7-D7CFBE513A84}"/>
+              </a:ext>
+            </a:extLst>
+          </p:cNvPr>
+          <p:cNvPicPr>
+            <a:picLocks noChangeAspect="1"/>
+          </p:cNvPicPr>
+          <p:nvPr/>
+        </p:nvPicPr>
+        <p:blipFill>
+          <a:blip r:embed="rId2"/>
+          <a:stretch>
+            <a:fillRect/>
+          </a:stretch>
+        </p:blipFill>
+        <p:spPr>
+          <a:xfrm>
+            <a:off x="1447800" y="3686175"/>
+            <a:ext cx="9296400" cy="3171825"/>
+          </a:xfrm>
+          <a:prstGeom prst="rect">
+            <a:avLst/>
+          </a:prstGeom>
+        </p:spPr>
+      </p:pic>
+      <p:sp>
+        <p:nvSpPr>
+          <p:cNvPr id="6" name="TextBox 5">
+            <a:extLst>
+              <a:ext uri="{FF2B5EF4-FFF2-40B4-BE49-F238E27FC236}">
+                <a16:creationId xmlns:a16="http://schemas.microsoft.com/office/drawing/2014/main" id="{DA85E61F-85EE-2747-1D95-758200086ACF}"/>
+              </a:ext>
+            </a:extLst>
+          </p:cNvPr>
+          <p:cNvSpPr txBox="1"/>
+          <p:nvPr/>
+        </p:nvSpPr>
+        <p:spPr>
+          <a:xfrm>
+            <a:off x="1837362" y="1321356"/>
+            <a:ext cx="8517276" cy="369332"/>
+          </a:xfrm>
+          <a:prstGeom prst="rect">
+            <a:avLst/>
+          </a:prstGeom>
+          <a:noFill/>
+        </p:spPr>
+        <p:txBody>
+          <a:bodyPr wrap="square" rtlCol="0">
+            <a:spAutoFit/>
+          </a:bodyPr>
+          <a:lstStyle/>
+          <a:p>
+            <a:r>
+              <a:rPr lang="en-GB" dirty="0"/>
+              <a:t>No webserver running on DC machine so </a:t>
+            </a:r>
+            <a:r>
+              <a:rPr lang="en-GB" dirty="0" err="1"/>
+              <a:t>nikto</a:t>
+            </a:r>
+            <a:r>
+              <a:rPr lang="en-GB" dirty="0"/>
+              <a:t> has nothing to scan</a:t>
+            </a:r>
+            <a:endParaRPr lang="en-AU" dirty="0"/>
+          </a:p>
+        </p:txBody>
+      </p:sp>
+    </p:spTree>
+    <p:extLst>
+      <p:ext uri="{BB962C8B-B14F-4D97-AF65-F5344CB8AC3E}">
+        <p14:creationId xmlns:p14="http://schemas.microsoft.com/office/powerpoint/2010/main" val="3902215629"/>
+      </p:ext>
+    </p:extLst>
+  </p:cSld>
+  <p:clrMapOvr>
+    <a:masterClrMapping/>
+  </p:clrMapOvr>
+</p:sld>
+</file>
+
+<file path=ppt/slides/slide6.xml><?xml version="1.0" encoding="utf-8"?>
+<p:sld xmlns:a="http://schemas.openxmlformats.org/drawingml/2006/main" xmlns:r="http://schemas.openxmlformats.org/officeDocument/2006/relationships" xmlns:p="http://schemas.openxmlformats.org/presentationml/2006/main">
+  <p:cSld>
+    <p:spTree>
+      <p:nvGrpSpPr>
+        <p:cNvPr id="1" name=""/>
+        <p:cNvGrpSpPr/>
+        <p:nvPr/>
+      </p:nvGrpSpPr>
+      <p:grpSpPr>
+        <a:xfrm>
+          <a:off x="0" y="0"/>
+          <a:ext cx="0" cy="0"/>
+          <a:chOff x="0" y="0"/>
+          <a:chExt cx="0" cy="0"/>
+        </a:xfrm>
+      </p:grpSpPr>
+      <p:sp>
+        <p:nvSpPr>
+          <p:cNvPr id="2" name="Title 1">
+            <a:extLst>
+              <a:ext uri="{FF2B5EF4-FFF2-40B4-BE49-F238E27FC236}">
+                <a16:creationId xmlns:a16="http://schemas.microsoft.com/office/drawing/2014/main" id="{2C53FAEC-9485-8C9B-8CFC-10C42FA89388}"/>
+              </a:ext>
+            </a:extLst>
+          </p:cNvPr>
+          <p:cNvSpPr>
+            <a:spLocks noGrp="1"/>
+          </p:cNvSpPr>
+          <p:nvPr>
+            <p:ph type="title"/>
+          </p:nvPr>
+        </p:nvSpPr>
+        <p:spPr/>
+        <p:txBody>
+          <a:bodyPr/>
+          <a:lstStyle/>
+          <a:p>
+            <a:r>
+              <a:rPr lang="en-GB" dirty="0" err="1"/>
+              <a:t>Nikto</a:t>
+            </a:r>
+            <a:r>
+              <a:rPr lang="en-GB" dirty="0"/>
+              <a:t> Odoo	</a:t>
+            </a:r>
+            <a:endParaRPr lang="en-AU" dirty="0"/>
+          </a:p>
+        </p:txBody>
+      </p:sp>
+      <p:pic>
+        <p:nvPicPr>
+          <p:cNvPr id="5" name="Picture 4">
+            <a:extLst>
+              <a:ext uri="{FF2B5EF4-FFF2-40B4-BE49-F238E27FC236}">
+                <a16:creationId xmlns:a16="http://schemas.microsoft.com/office/drawing/2014/main" id="{1DF29FCA-B432-2C72-1B8C-391445F06765}"/>
+              </a:ext>
+            </a:extLst>
+          </p:cNvPr>
+          <p:cNvPicPr>
+            <a:picLocks noChangeAspect="1"/>
+          </p:cNvPicPr>
+          <p:nvPr/>
+        </p:nvPicPr>
+        <p:blipFill>
+          <a:blip r:embed="rId2"/>
+          <a:stretch>
+            <a:fillRect/>
+          </a:stretch>
+        </p:blipFill>
+        <p:spPr>
+          <a:xfrm>
+            <a:off x="410056" y="1690688"/>
+            <a:ext cx="6029325" cy="4162425"/>
+          </a:xfrm>
+          <a:prstGeom prst="rect">
+            <a:avLst/>
+          </a:prstGeom>
+        </p:spPr>
+      </p:pic>
+      <p:sp>
+        <p:nvSpPr>
+          <p:cNvPr id="6" name="TextBox 5">
+            <a:extLst>
+              <a:ext uri="{FF2B5EF4-FFF2-40B4-BE49-F238E27FC236}">
+                <a16:creationId xmlns:a16="http://schemas.microsoft.com/office/drawing/2014/main" id="{BCA876A0-8A03-6B8E-58FB-F2453D3039BD}"/>
+              </a:ext>
+            </a:extLst>
+          </p:cNvPr>
+          <p:cNvSpPr txBox="1"/>
+          <p:nvPr/>
+        </p:nvSpPr>
+        <p:spPr>
+          <a:xfrm>
+            <a:off x="6904234" y="1315092"/>
+            <a:ext cx="4877710" cy="923330"/>
+          </a:xfrm>
+          <a:prstGeom prst="rect">
+            <a:avLst/>
+          </a:prstGeom>
+          <a:noFill/>
+        </p:spPr>
+        <p:txBody>
+          <a:bodyPr wrap="square" rtlCol="0">
+            <a:spAutoFit/>
+          </a:bodyPr>
+          <a:lstStyle/>
+          <a:p>
+            <a:r>
+              <a:rPr lang="en-GB" dirty="0"/>
+              <a:t>No vulnerabilities found however web server is outdated and some configuration issues were found.</a:t>
+            </a:r>
+            <a:endParaRPr lang="en-AU" dirty="0"/>
+          </a:p>
+        </p:txBody>
+      </p:sp>
+    </p:spTree>
+    <p:extLst>
+      <p:ext uri="{BB962C8B-B14F-4D97-AF65-F5344CB8AC3E}">
+        <p14:creationId xmlns:p14="http://schemas.microsoft.com/office/powerpoint/2010/main" val="3259637870"/>
+      </p:ext>
+    </p:extLst>
+  </p:cSld>
+  <p:clrMapOvr>
+    <a:masterClrMapping/>
+  </p:clrMapOvr>
+</p:sld>
+</file>
+
+<file path=ppt/slides/slide7.xml><?xml version="1.0" encoding="utf-8"?>
+<p:sld xmlns:a="http://schemas.openxmlformats.org/drawingml/2006/main" xmlns:r="http://schemas.openxmlformats.org/officeDocument/2006/relationships" xmlns:p="http://schemas.openxmlformats.org/presentationml/2006/main">
+  <p:cSld>
+    <p:spTree>
+      <p:nvGrpSpPr>
+        <p:cNvPr id="1" name=""/>
+        <p:cNvGrpSpPr/>
+        <p:nvPr/>
+      </p:nvGrpSpPr>
+      <p:grpSpPr>
+        <a:xfrm>
+          <a:off x="0" y="0"/>
+          <a:ext cx="0" cy="0"/>
+          <a:chOff x="0" y="0"/>
+          <a:chExt cx="0" cy="0"/>
+        </a:xfrm>
+      </p:grpSpPr>
+      <p:sp>
+        <p:nvSpPr>
+          <p:cNvPr id="2" name="Title 1">
+            <a:extLst>
+              <a:ext uri="{FF2B5EF4-FFF2-40B4-BE49-F238E27FC236}">
+                <a16:creationId xmlns:a16="http://schemas.microsoft.com/office/drawing/2014/main" id="{FCAAF839-DFB6-868A-D5F5-555D227B8904}"/>
+              </a:ext>
+            </a:extLst>
+          </p:cNvPr>
+          <p:cNvSpPr>
+            <a:spLocks noGrp="1"/>
+          </p:cNvSpPr>
+          <p:nvPr>
+            <p:ph type="title"/>
+          </p:nvPr>
+        </p:nvSpPr>
+        <p:spPr/>
+        <p:txBody>
+          <a:bodyPr/>
+          <a:lstStyle/>
+          <a:p>
+            <a:r>
+              <a:rPr lang="en-GB" dirty="0"/>
+              <a:t>Legion</a:t>
+            </a:r>
+            <a:endParaRPr lang="en-AU" dirty="0"/>
+          </a:p>
+        </p:txBody>
+      </p:sp>
+    </p:spTree>
+    <p:extLst>
+      <p:ext uri="{BB962C8B-B14F-4D97-AF65-F5344CB8AC3E}">
+        <p14:creationId xmlns:p14="http://schemas.microsoft.com/office/powerpoint/2010/main" val="976480356"/>
       </p:ext>
     </p:extLst>
   </p:cSld>

</xml_diff>

<commit_message>
Added template to CPE_helper
</commit_message>
<xml_diff>
--- a/evidence.pptx
+++ b/evidence.pptx
@@ -5,7 +5,7 @@
     <p:sldMasterId id="2147483648" r:id="rId1"/>
   </p:sldMasterIdLst>
   <p:notesMasterIdLst>
-    <p:notesMasterId r:id="rId18"/>
+    <p:notesMasterId r:id="rId19"/>
   </p:notesMasterIdLst>
   <p:sldIdLst>
     <p:sldId id="256" r:id="rId2"/>
@@ -24,6 +24,7 @@
     <p:sldId id="269" r:id="rId15"/>
     <p:sldId id="270" r:id="rId16"/>
     <p:sldId id="271" r:id="rId17"/>
+    <p:sldId id="272" r:id="rId18"/>
   </p:sldIdLst>
   <p:sldSz cx="12192000" cy="6858000"/>
   <p:notesSz cx="6858000" cy="9144000"/>
@@ -212,7 +213,7 @@
           <a:p>
             <a:fld id="{CA563FB9-A1D1-4D2E-961A-D674896EE6A6}" type="datetimeFigureOut">
               <a:rPr lang="en-AU" smtClean="0"/>
-              <a:t>8/09/2023</a:t>
+              <a:t>9/09/2023</a:t>
             </a:fld>
             <a:endParaRPr lang="en-AU"/>
           </a:p>
@@ -713,7 +714,7 @@
           <a:p>
             <a:fld id="{AC86EEEC-B469-4479-988E-2EF5FAF4E7F2}" type="datetimeFigureOut">
               <a:rPr lang="en-AU" smtClean="0"/>
-              <a:t>8/09/2023</a:t>
+              <a:t>9/09/2023</a:t>
             </a:fld>
             <a:endParaRPr lang="en-AU"/>
           </a:p>
@@ -913,7 +914,7 @@
           <a:p>
             <a:fld id="{AC86EEEC-B469-4479-988E-2EF5FAF4E7F2}" type="datetimeFigureOut">
               <a:rPr lang="en-AU" smtClean="0"/>
-              <a:t>8/09/2023</a:t>
+              <a:t>9/09/2023</a:t>
             </a:fld>
             <a:endParaRPr lang="en-AU"/>
           </a:p>
@@ -1123,7 +1124,7 @@
           <a:p>
             <a:fld id="{AC86EEEC-B469-4479-988E-2EF5FAF4E7F2}" type="datetimeFigureOut">
               <a:rPr lang="en-AU" smtClean="0"/>
-              <a:t>8/09/2023</a:t>
+              <a:t>9/09/2023</a:t>
             </a:fld>
             <a:endParaRPr lang="en-AU"/>
           </a:p>
@@ -1323,7 +1324,7 @@
           <a:p>
             <a:fld id="{AC86EEEC-B469-4479-988E-2EF5FAF4E7F2}" type="datetimeFigureOut">
               <a:rPr lang="en-AU" smtClean="0"/>
-              <a:t>8/09/2023</a:t>
+              <a:t>9/09/2023</a:t>
             </a:fld>
             <a:endParaRPr lang="en-AU"/>
           </a:p>
@@ -1599,7 +1600,7 @@
           <a:p>
             <a:fld id="{AC86EEEC-B469-4479-988E-2EF5FAF4E7F2}" type="datetimeFigureOut">
               <a:rPr lang="en-AU" smtClean="0"/>
-              <a:t>8/09/2023</a:t>
+              <a:t>9/09/2023</a:t>
             </a:fld>
             <a:endParaRPr lang="en-AU"/>
           </a:p>
@@ -1867,7 +1868,7 @@
           <a:p>
             <a:fld id="{AC86EEEC-B469-4479-988E-2EF5FAF4E7F2}" type="datetimeFigureOut">
               <a:rPr lang="en-AU" smtClean="0"/>
-              <a:t>8/09/2023</a:t>
+              <a:t>9/09/2023</a:t>
             </a:fld>
             <a:endParaRPr lang="en-AU"/>
           </a:p>
@@ -2282,7 +2283,7 @@
           <a:p>
             <a:fld id="{AC86EEEC-B469-4479-988E-2EF5FAF4E7F2}" type="datetimeFigureOut">
               <a:rPr lang="en-AU" smtClean="0"/>
-              <a:t>8/09/2023</a:t>
+              <a:t>9/09/2023</a:t>
             </a:fld>
             <a:endParaRPr lang="en-AU"/>
           </a:p>
@@ -2424,7 +2425,7 @@
           <a:p>
             <a:fld id="{AC86EEEC-B469-4479-988E-2EF5FAF4E7F2}" type="datetimeFigureOut">
               <a:rPr lang="en-AU" smtClean="0"/>
-              <a:t>8/09/2023</a:t>
+              <a:t>9/09/2023</a:t>
             </a:fld>
             <a:endParaRPr lang="en-AU"/>
           </a:p>
@@ -2537,7 +2538,7 @@
           <a:p>
             <a:fld id="{AC86EEEC-B469-4479-988E-2EF5FAF4E7F2}" type="datetimeFigureOut">
               <a:rPr lang="en-AU" smtClean="0"/>
-              <a:t>8/09/2023</a:t>
+              <a:t>9/09/2023</a:t>
             </a:fld>
             <a:endParaRPr lang="en-AU"/>
           </a:p>
@@ -2850,7 +2851,7 @@
           <a:p>
             <a:fld id="{AC86EEEC-B469-4479-988E-2EF5FAF4E7F2}" type="datetimeFigureOut">
               <a:rPr lang="en-AU" smtClean="0"/>
-              <a:t>8/09/2023</a:t>
+              <a:t>9/09/2023</a:t>
             </a:fld>
             <a:endParaRPr lang="en-AU"/>
           </a:p>
@@ -3139,7 +3140,7 @@
           <a:p>
             <a:fld id="{AC86EEEC-B469-4479-988E-2EF5FAF4E7F2}" type="datetimeFigureOut">
               <a:rPr lang="en-AU" smtClean="0"/>
-              <a:t>8/09/2023</a:t>
+              <a:t>9/09/2023</a:t>
             </a:fld>
             <a:endParaRPr lang="en-AU"/>
           </a:p>
@@ -3382,7 +3383,7 @@
           <a:p>
             <a:fld id="{AC86EEEC-B469-4479-988E-2EF5FAF4E7F2}" type="datetimeFigureOut">
               <a:rPr lang="en-AU" smtClean="0"/>
-              <a:t>8/09/2023</a:t>
+              <a:t>9/09/2023</a:t>
             </a:fld>
             <a:endParaRPr lang="en-AU"/>
           </a:p>
@@ -4650,6 +4651,95 @@
     <p:extLst>
       <p:ext uri="{BB962C8B-B14F-4D97-AF65-F5344CB8AC3E}">
         <p14:creationId xmlns:p14="http://schemas.microsoft.com/office/powerpoint/2010/main" val="83400041"/>
+      </p:ext>
+    </p:extLst>
+  </p:cSld>
+  <p:clrMapOvr>
+    <a:masterClrMapping/>
+  </p:clrMapOvr>
+</p:sld>
+</file>
+
+<file path=ppt/slides/slide17.xml><?xml version="1.0" encoding="utf-8"?>
+<p:sld xmlns:a="http://schemas.openxmlformats.org/drawingml/2006/main" xmlns:r="http://schemas.openxmlformats.org/officeDocument/2006/relationships" xmlns:p="http://schemas.openxmlformats.org/presentationml/2006/main">
+  <p:cSld>
+    <p:spTree>
+      <p:nvGrpSpPr>
+        <p:cNvPr id="1" name=""/>
+        <p:cNvGrpSpPr/>
+        <p:nvPr/>
+      </p:nvGrpSpPr>
+      <p:grpSpPr>
+        <a:xfrm>
+          <a:off x="0" y="0"/>
+          <a:ext cx="0" cy="0"/>
+          <a:chOff x="0" y="0"/>
+          <a:chExt cx="0" cy="0"/>
+        </a:xfrm>
+      </p:grpSpPr>
+      <p:sp>
+        <p:nvSpPr>
+          <p:cNvPr id="2" name="Title 1">
+            <a:extLst>
+              <a:ext uri="{FF2B5EF4-FFF2-40B4-BE49-F238E27FC236}">
+                <a16:creationId xmlns:a16="http://schemas.microsoft.com/office/drawing/2014/main" id="{59F8DECA-8089-AF69-9EF1-DD85B8FAB1F6}"/>
+              </a:ext>
+            </a:extLst>
+          </p:cNvPr>
+          <p:cNvSpPr>
+            <a:spLocks noGrp="1"/>
+          </p:cNvSpPr>
+          <p:nvPr>
+            <p:ph type="title"/>
+          </p:nvPr>
+        </p:nvSpPr>
+        <p:spPr/>
+        <p:txBody>
+          <a:bodyPr/>
+          <a:lstStyle/>
+          <a:p>
+            <a:r>
+              <a:rPr lang="en-AU" dirty="0" err="1"/>
+              <a:t>Wazuh</a:t>
+            </a:r>
+            <a:endParaRPr lang="en-AU" dirty="0"/>
+          </a:p>
+        </p:txBody>
+      </p:sp>
+      <p:pic>
+        <p:nvPicPr>
+          <p:cNvPr id="5" name="Picture 4">
+            <a:extLst>
+              <a:ext uri="{FF2B5EF4-FFF2-40B4-BE49-F238E27FC236}">
+                <a16:creationId xmlns:a16="http://schemas.microsoft.com/office/drawing/2014/main" id="{BE87693F-D778-2363-BBB6-99519131C9A5}"/>
+              </a:ext>
+            </a:extLst>
+          </p:cNvPr>
+          <p:cNvPicPr>
+            <a:picLocks noChangeAspect="1"/>
+          </p:cNvPicPr>
+          <p:nvPr/>
+        </p:nvPicPr>
+        <p:blipFill>
+          <a:blip r:embed="rId2"/>
+          <a:stretch>
+            <a:fillRect/>
+          </a:stretch>
+        </p:blipFill>
+        <p:spPr>
+          <a:xfrm>
+            <a:off x="0" y="1969863"/>
+            <a:ext cx="12192000" cy="2918273"/>
+          </a:xfrm>
+          <a:prstGeom prst="rect">
+            <a:avLst/>
+          </a:prstGeom>
+        </p:spPr>
+      </p:pic>
+    </p:spTree>
+    <p:extLst>
+      <p:ext uri="{BB962C8B-B14F-4D97-AF65-F5344CB8AC3E}">
+        <p14:creationId xmlns:p14="http://schemas.microsoft.com/office/powerpoint/2010/main" val="3757028752"/>
       </p:ext>
     </p:extLst>
   </p:cSld>

</xml_diff>